<commit_message>
fix bug in pptx
</commit_message>
<xml_diff>
--- a/SPL 1 Presentation (1507).pptx
+++ b/SPL 1 Presentation (1507).pptx
@@ -11,22 +11,23 @@
     <p:sldMasterId id="2147483660" r:id="rId8"/>
     <p:sldMasterId id="2147483662" r:id="rId9"/>
     <p:sldMasterId id="2147483664" r:id="rId10"/>
+    <p:sldMasterId id="2147483666" r:id="rId11"/>
   </p:sldMasterIdLst>
   <p:sldIdLst>
-    <p:sldId id="256" r:id="rId11"/>
-    <p:sldId id="257" r:id="rId12"/>
-    <p:sldId id="258" r:id="rId13"/>
-    <p:sldId id="259" r:id="rId14"/>
-    <p:sldId id="260" r:id="rId15"/>
-    <p:sldId id="261" r:id="rId16"/>
-    <p:sldId id="262" r:id="rId17"/>
-    <p:sldId id="263" r:id="rId18"/>
-    <p:sldId id="264" r:id="rId19"/>
-    <p:sldId id="265" r:id="rId20"/>
-    <p:sldId id="266" r:id="rId21"/>
-    <p:sldId id="267" r:id="rId22"/>
-    <p:sldId id="268" r:id="rId23"/>
-    <p:sldId id="269" r:id="rId24"/>
+    <p:sldId id="256" r:id="rId12"/>
+    <p:sldId id="257" r:id="rId13"/>
+    <p:sldId id="258" r:id="rId14"/>
+    <p:sldId id="259" r:id="rId15"/>
+    <p:sldId id="260" r:id="rId16"/>
+    <p:sldId id="261" r:id="rId17"/>
+    <p:sldId id="262" r:id="rId18"/>
+    <p:sldId id="263" r:id="rId19"/>
+    <p:sldId id="264" r:id="rId20"/>
+    <p:sldId id="265" r:id="rId21"/>
+    <p:sldId id="266" r:id="rId22"/>
+    <p:sldId id="267" r:id="rId23"/>
+    <p:sldId id="268" r:id="rId24"/>
+    <p:sldId id="269" r:id="rId25"/>
   </p:sldIdLst>
   <p:sldSz cx="9144000" cy="5143500"/>
   <p:notesSz cx="7772400" cy="10058400"/>
@@ -138,8 +139,112 @@
 </file>
 
 <file path=ppt/slideLayouts/slideLayout10.xml><?xml version="1.0" encoding="utf-8"?>
+<p:sldLayout xmlns:a="http://schemas.openxmlformats.org/drawingml/2006/main" xmlns:p="http://schemas.openxmlformats.org/presentationml/2006/main" xmlns:r="http://schemas.openxmlformats.org/officeDocument/2006/relationships" xmlns:p14="http://schemas.microsoft.com/office/powerpoint/2010/main" xmlns:p15="http://schemas.microsoft.com/office/powerpoint/2012/main" xmlns:mc="http://schemas.openxmlformats.org/markup-compatibility/2006" type="title" preserve="1">
+  <p:cSld name="Default 1">
+    <p:spTree>
+      <p:nvGrpSpPr>
+        <p:cNvPr id="1" name=""/>
+        <p:cNvGrpSpPr/>
+        <p:nvPr/>
+      </p:nvGrpSpPr>
+      <p:grpSpPr>
+        <a:xfrm>
+          <a:off x="0" y="0"/>
+          <a:ext cx="0" cy="0"/>
+          <a:chOff x="0" y="0"/>
+          <a:chExt cx="0" cy="0"/>
+        </a:xfrm>
+      </p:grpSpPr>
+      <p:sp>
+        <p:nvSpPr>
+          <p:cNvPr id="36" name="PlaceHolder 1"/>
+          <p:cNvSpPr>
+            <a:spLocks noGrp="1"/>
+          </p:cNvSpPr>
+          <p:nvPr>
+            <p:ph type="title"/>
+          </p:nvPr>
+        </p:nvSpPr>
+        <p:spPr>
+          <a:xfrm>
+            <a:off x="457200" y="205200"/>
+            <a:ext cx="8229240" cy="858600"/>
+          </a:xfrm>
+          <a:prstGeom prst="rect">
+            <a:avLst/>
+          </a:prstGeom>
+          <a:noFill/>
+          <a:ln w="0">
+            <a:noFill/>
+          </a:ln>
+        </p:spPr>
+        <p:txBody>
+          <a:bodyPr lIns="0" rIns="0" tIns="0" bIns="0" anchor="ctr">
+            <a:noAutofit/>
+          </a:bodyPr>
+          <a:p>
+            <a:pPr indent="0" algn="ctr">
+              <a:buNone/>
+            </a:pPr>
+            <a:endParaRPr b="0" lang="en-US" sz="4400" strike="noStrike" u="none">
+              <a:solidFill>
+                <a:srgbClr val="000000"/>
+              </a:solidFill>
+              <a:uFillTx/>
+              <a:latin typeface="Arial"/>
+            </a:endParaRPr>
+          </a:p>
+        </p:txBody>
+      </p:sp>
+      <p:sp>
+        <p:nvSpPr>
+          <p:cNvPr id="37" name="PlaceHolder 2"/>
+          <p:cNvSpPr>
+            <a:spLocks noGrp="1"/>
+          </p:cNvSpPr>
+          <p:nvPr>
+            <p:ph type="subTitle"/>
+          </p:nvPr>
+        </p:nvSpPr>
+        <p:spPr>
+          <a:xfrm>
+            <a:off x="457200" y="1203480"/>
+            <a:ext cx="8229240" cy="2982960"/>
+          </a:xfrm>
+          <a:prstGeom prst="rect">
+            <a:avLst/>
+          </a:prstGeom>
+          <a:noFill/>
+          <a:ln w="0">
+            <a:noFill/>
+          </a:ln>
+        </p:spPr>
+        <p:txBody>
+          <a:bodyPr lIns="0" rIns="0" tIns="0" bIns="0" anchor="ctr">
+            <a:noAutofit/>
+          </a:bodyPr>
+          <a:p>
+            <a:pPr indent="0" algn="ctr">
+              <a:buNone/>
+            </a:pPr>
+            <a:endParaRPr b="0" lang="en-US" sz="3200" strike="noStrike" u="none">
+              <a:solidFill>
+                <a:srgbClr val="000000"/>
+              </a:solidFill>
+              <a:uFillTx/>
+              <a:latin typeface="Arial"/>
+            </a:endParaRPr>
+          </a:p>
+        </p:txBody>
+      </p:sp>
+    </p:spTree>
+  </p:cSld>
+</p:sldLayout>
+</file>
+
+<file path=ppt/slideLayouts/slideLayout11.xml><?xml version="1.0" encoding="utf-8"?>
 <p:sldLayout xmlns:a="http://schemas.openxmlformats.org/drawingml/2006/main" xmlns:p="http://schemas.openxmlformats.org/presentationml/2006/main" xmlns:r="http://schemas.openxmlformats.org/officeDocument/2006/relationships" xmlns:p14="http://schemas.microsoft.com/office/powerpoint/2010/main" xmlns:p15="http://schemas.microsoft.com/office/powerpoint/2012/main" xmlns:mc="http://schemas.openxmlformats.org/markup-compatibility/2006" type="blank" preserve="1">
-  <p:cSld name="Default">
+  <p:cSld name="Default 1">
     <p:spTree>
       <p:nvGrpSpPr>
         <p:cNvPr id="1" name=""/>
@@ -414,7 +519,7 @@
       </p:grpSpPr>
       <p:sp>
         <p:nvSpPr>
-          <p:cNvPr id="32" name="PlaceHolder 1"/>
+          <p:cNvPr id="31" name="PlaceHolder 1"/>
           <p:cNvSpPr>
             <a:spLocks noGrp="1"/>
           </p:cNvSpPr>
@@ -455,7 +560,7 @@
       </p:sp>
       <p:sp>
         <p:nvSpPr>
-          <p:cNvPr id="33" name="PlaceHolder 2"/>
+          <p:cNvPr id="32" name="PlaceHolder 2"/>
           <p:cNvSpPr>
             <a:spLocks noGrp="1"/>
           </p:cNvSpPr>
@@ -532,7 +637,7 @@
         <p:spPr>
           <a:xfrm>
             <a:off x="0" y="0"/>
-            <a:ext cx="1215360" cy="2570760"/>
+            <a:ext cx="1215000" cy="2570400"/>
           </a:xfrm>
           <a:prstGeom prst="rect">
             <a:avLst/>
@@ -586,8 +691,8 @@
         </p:nvSpPr>
         <p:spPr>
           <a:xfrm>
-            <a:off x="717840" y="383040"/>
-            <a:ext cx="7707600" cy="739800"/>
+            <a:off x="457200" y="205200"/>
+            <a:ext cx="8228880" cy="858240"/>
           </a:xfrm>
           <a:prstGeom prst="rect">
             <a:avLst/>
@@ -869,6 +974,381 @@
   <p:clrMap bg1="lt1" tx1="dk1" bg2="dk2" tx2="lt2" accent1="accent1" accent2="accent2" accent3="accent3" accent4="accent4" accent5="accent5" accent6="accent6" hlink="hlink" folHlink="folHlink"/>
   <p:sldLayoutIdLst>
     <p:sldLayoutId id="2147483649" r:id="rId2"/>
+  </p:sldLayoutIdLst>
+</p:sldMaster>
+</file>
+
+<file path=ppt/slideMasters/slideMaster10.xml><?xml version="1.0" encoding="utf-8"?>
+<p:sldMaster xmlns:a="http://schemas.openxmlformats.org/drawingml/2006/main" xmlns:p="http://schemas.openxmlformats.org/presentationml/2006/main" xmlns:r="http://schemas.openxmlformats.org/officeDocument/2006/relationships" xmlns:p14="http://schemas.microsoft.com/office/powerpoint/2010/main" xmlns:p15="http://schemas.microsoft.com/office/powerpoint/2012/main" xmlns:mc="http://schemas.openxmlformats.org/markup-compatibility/2006">
+  <p:cSld>
+    <p:bg>
+      <p:bgPr>
+        <a:solidFill>
+          <a:schemeClr val="lt1"/>
+        </a:solidFill>
+      </p:bgPr>
+    </p:bg>
+    <p:spTree>
+      <p:nvGrpSpPr>
+        <p:cNvPr id="1" name=""/>
+        <p:cNvGrpSpPr/>
+        <p:nvPr/>
+      </p:nvGrpSpPr>
+      <p:grpSpPr>
+        <a:xfrm>
+          <a:off x="0" y="0"/>
+          <a:ext cx="0" cy="0"/>
+          <a:chOff x="0" y="0"/>
+          <a:chExt cx="0" cy="0"/>
+        </a:xfrm>
+      </p:grpSpPr>
+      <p:sp>
+        <p:nvSpPr>
+          <p:cNvPr id="33" name="Google Shape;145;p24"/>
+          <p:cNvSpPr/>
+          <p:nvPr/>
+        </p:nvSpPr>
+        <p:spPr>
+          <a:xfrm>
+            <a:off x="7927920" y="2571480"/>
+            <a:ext cx="1215000" cy="2570400"/>
+          </a:xfrm>
+          <a:prstGeom prst="rect">
+            <a:avLst/>
+          </a:prstGeom>
+          <a:solidFill>
+            <a:schemeClr val="accent1"/>
+          </a:solidFill>
+          <a:ln w="0">
+            <a:noFill/>
+          </a:ln>
+        </p:spPr>
+        <p:style>
+          <a:lnRef idx="0"/>
+          <a:fillRef idx="0"/>
+          <a:effectRef idx="0"/>
+          <a:fontRef idx="minor"/>
+        </p:style>
+        <p:txBody>
+          <a:bodyPr lIns="90000" rIns="90000" tIns="91440" bIns="91440" anchor="ctr">
+            <a:noAutofit/>
+          </a:bodyPr>
+          <a:p>
+            <a:pPr>
+              <a:lnSpc>
+                <a:spcPct val="100000"/>
+              </a:lnSpc>
+              <a:tabLst>
+                <a:tab algn="l" pos="0"/>
+              </a:tabLst>
+            </a:pPr>
+            <a:endParaRPr b="0" lang="en-US" sz="1400" strike="noStrike" u="none">
+              <a:solidFill>
+                <a:srgbClr val="000000"/>
+              </a:solidFill>
+              <a:uFillTx/>
+              <a:latin typeface="Arial"/>
+              <a:ea typeface="Arial"/>
+            </a:endParaRPr>
+          </a:p>
+        </p:txBody>
+      </p:sp>
+      <p:sp>
+        <p:nvSpPr>
+          <p:cNvPr id="34" name="PlaceHolder 1"/>
+          <p:cNvSpPr>
+            <a:spLocks noGrp="1"/>
+          </p:cNvSpPr>
+          <p:nvPr>
+            <p:ph type="title"/>
+          </p:nvPr>
+        </p:nvSpPr>
+        <p:spPr>
+          <a:xfrm>
+            <a:off x="457200" y="205200"/>
+            <a:ext cx="8229240" cy="858600"/>
+          </a:xfrm>
+          <a:prstGeom prst="rect">
+            <a:avLst/>
+          </a:prstGeom>
+          <a:noFill/>
+          <a:ln w="0">
+            <a:noFill/>
+          </a:ln>
+        </p:spPr>
+        <p:txBody>
+          <a:bodyPr lIns="0" rIns="0" tIns="0" bIns="0" anchor="ctr">
+            <a:noAutofit/>
+          </a:bodyPr>
+          <a:p>
+            <a:pPr indent="0" algn="ctr">
+              <a:buNone/>
+            </a:pPr>
+            <a:r>
+              <a:rPr b="0" lang="en-US" sz="4400" strike="noStrike" u="none">
+                <a:solidFill>
+                  <a:srgbClr val="000000"/>
+                </a:solidFill>
+                <a:uFillTx/>
+                <a:latin typeface="Arial"/>
+              </a:rPr>
+              <a:t>Click to edit the title text format</a:t>
+            </a:r>
+            <a:endParaRPr b="0" lang="en-US" sz="4400" strike="noStrike" u="none">
+              <a:solidFill>
+                <a:srgbClr val="000000"/>
+              </a:solidFill>
+              <a:uFillTx/>
+              <a:latin typeface="Arial"/>
+            </a:endParaRPr>
+          </a:p>
+        </p:txBody>
+      </p:sp>
+      <p:sp>
+        <p:nvSpPr>
+          <p:cNvPr id="35" name="PlaceHolder 2"/>
+          <p:cNvSpPr>
+            <a:spLocks noGrp="1"/>
+          </p:cNvSpPr>
+          <p:nvPr>
+            <p:ph type="body"/>
+          </p:nvPr>
+        </p:nvSpPr>
+        <p:spPr>
+          <a:xfrm>
+            <a:off x="457200" y="1203480"/>
+            <a:ext cx="8229240" cy="2982960"/>
+          </a:xfrm>
+          <a:prstGeom prst="rect">
+            <a:avLst/>
+          </a:prstGeom>
+          <a:noFill/>
+          <a:ln w="0">
+            <a:noFill/>
+          </a:ln>
+        </p:spPr>
+        <p:txBody>
+          <a:bodyPr lIns="0" rIns="0" tIns="0" bIns="0" anchor="t">
+            <a:normAutofit/>
+          </a:bodyPr>
+          <a:p>
+            <a:pPr marL="432000" indent="-324000">
+              <a:spcBef>
+                <a:spcPts val="1417"/>
+              </a:spcBef>
+              <a:buClr>
+                <a:srgbClr val="000000"/>
+              </a:buClr>
+              <a:buSzPct val="45000"/>
+              <a:buFont typeface="Wingdings" charset="2"/>
+              <a:buChar char=""/>
+            </a:pPr>
+            <a:r>
+              <a:rPr b="0" lang="en-US" sz="3200" strike="noStrike" u="none">
+                <a:solidFill>
+                  <a:srgbClr val="000000"/>
+                </a:solidFill>
+                <a:uFillTx/>
+                <a:latin typeface="Arial"/>
+              </a:rPr>
+              <a:t>Click to edit the outline text format</a:t>
+            </a:r>
+            <a:endParaRPr b="0" lang="en-US" sz="3200" strike="noStrike" u="none">
+              <a:solidFill>
+                <a:srgbClr val="000000"/>
+              </a:solidFill>
+              <a:uFillTx/>
+              <a:latin typeface="Arial"/>
+            </a:endParaRPr>
+          </a:p>
+          <a:p>
+            <a:pPr lvl="1" marL="864000" indent="-324000">
+              <a:spcBef>
+                <a:spcPts val="1134"/>
+              </a:spcBef>
+              <a:buClr>
+                <a:srgbClr val="000000"/>
+              </a:buClr>
+              <a:buSzPct val="75000"/>
+              <a:buFont typeface="Symbol" charset="2"/>
+              <a:buChar char=""/>
+            </a:pPr>
+            <a:r>
+              <a:rPr b="0" lang="en-US" sz="2800" strike="noStrike" u="none">
+                <a:solidFill>
+                  <a:srgbClr val="000000"/>
+                </a:solidFill>
+                <a:uFillTx/>
+                <a:latin typeface="Arial"/>
+              </a:rPr>
+              <a:t>Second Outline Level</a:t>
+            </a:r>
+            <a:endParaRPr b="0" lang="en-US" sz="2800" strike="noStrike" u="none">
+              <a:solidFill>
+                <a:srgbClr val="000000"/>
+              </a:solidFill>
+              <a:uFillTx/>
+              <a:latin typeface="Arial"/>
+            </a:endParaRPr>
+          </a:p>
+          <a:p>
+            <a:pPr lvl="2" marL="1296000" indent="-288000">
+              <a:spcBef>
+                <a:spcPts val="850"/>
+              </a:spcBef>
+              <a:buClr>
+                <a:srgbClr val="000000"/>
+              </a:buClr>
+              <a:buSzPct val="45000"/>
+              <a:buFont typeface="Wingdings" charset="2"/>
+              <a:buChar char=""/>
+            </a:pPr>
+            <a:r>
+              <a:rPr b="0" lang="en-US" sz="2400" strike="noStrike" u="none">
+                <a:solidFill>
+                  <a:srgbClr val="000000"/>
+                </a:solidFill>
+                <a:uFillTx/>
+                <a:latin typeface="Arial"/>
+              </a:rPr>
+              <a:t>Third Outline Level</a:t>
+            </a:r>
+            <a:endParaRPr b="0" lang="en-US" sz="2400" strike="noStrike" u="none">
+              <a:solidFill>
+                <a:srgbClr val="000000"/>
+              </a:solidFill>
+              <a:uFillTx/>
+              <a:latin typeface="Arial"/>
+            </a:endParaRPr>
+          </a:p>
+          <a:p>
+            <a:pPr lvl="3" marL="1728000" indent="-216000">
+              <a:spcBef>
+                <a:spcPts val="567"/>
+              </a:spcBef>
+              <a:buClr>
+                <a:srgbClr val="000000"/>
+              </a:buClr>
+              <a:buSzPct val="75000"/>
+              <a:buFont typeface="Symbol" charset="2"/>
+              <a:buChar char=""/>
+            </a:pPr>
+            <a:r>
+              <a:rPr b="0" lang="en-US" sz="2000" strike="noStrike" u="none">
+                <a:solidFill>
+                  <a:srgbClr val="000000"/>
+                </a:solidFill>
+                <a:uFillTx/>
+                <a:latin typeface="Arial"/>
+              </a:rPr>
+              <a:t>Fourth Outline Level</a:t>
+            </a:r>
+            <a:endParaRPr b="0" lang="en-US" sz="2000" strike="noStrike" u="none">
+              <a:solidFill>
+                <a:srgbClr val="000000"/>
+              </a:solidFill>
+              <a:uFillTx/>
+              <a:latin typeface="Arial"/>
+            </a:endParaRPr>
+          </a:p>
+          <a:p>
+            <a:pPr lvl="4" marL="2160000" indent="-216000">
+              <a:spcBef>
+                <a:spcPts val="283"/>
+              </a:spcBef>
+              <a:buClr>
+                <a:srgbClr val="000000"/>
+              </a:buClr>
+              <a:buSzPct val="45000"/>
+              <a:buFont typeface="Wingdings" charset="2"/>
+              <a:buChar char=""/>
+            </a:pPr>
+            <a:r>
+              <a:rPr b="0" lang="en-US" sz="2000" strike="noStrike" u="none">
+                <a:solidFill>
+                  <a:srgbClr val="000000"/>
+                </a:solidFill>
+                <a:uFillTx/>
+                <a:latin typeface="Arial"/>
+              </a:rPr>
+              <a:t>Fifth Outline Level</a:t>
+            </a:r>
+            <a:endParaRPr b="0" lang="en-US" sz="2000" strike="noStrike" u="none">
+              <a:solidFill>
+                <a:srgbClr val="000000"/>
+              </a:solidFill>
+              <a:uFillTx/>
+              <a:latin typeface="Arial"/>
+            </a:endParaRPr>
+          </a:p>
+          <a:p>
+            <a:pPr lvl="5" marL="2592000" indent="-216000">
+              <a:spcBef>
+                <a:spcPts val="283"/>
+              </a:spcBef>
+              <a:buClr>
+                <a:srgbClr val="000000"/>
+              </a:buClr>
+              <a:buSzPct val="45000"/>
+              <a:buFont typeface="Wingdings" charset="2"/>
+              <a:buChar char=""/>
+            </a:pPr>
+            <a:r>
+              <a:rPr b="0" lang="en-US" sz="2000" strike="noStrike" u="none">
+                <a:solidFill>
+                  <a:srgbClr val="000000"/>
+                </a:solidFill>
+                <a:uFillTx/>
+                <a:latin typeface="Arial"/>
+              </a:rPr>
+              <a:t>Sixth Outline Level</a:t>
+            </a:r>
+            <a:endParaRPr b="0" lang="en-US" sz="2000" strike="noStrike" u="none">
+              <a:solidFill>
+                <a:srgbClr val="000000"/>
+              </a:solidFill>
+              <a:uFillTx/>
+              <a:latin typeface="Arial"/>
+            </a:endParaRPr>
+          </a:p>
+          <a:p>
+            <a:pPr lvl="6" marL="3024000" indent="-216000">
+              <a:spcBef>
+                <a:spcPts val="283"/>
+              </a:spcBef>
+              <a:buClr>
+                <a:srgbClr val="000000"/>
+              </a:buClr>
+              <a:buSzPct val="45000"/>
+              <a:buFont typeface="Wingdings" charset="2"/>
+              <a:buChar char=""/>
+            </a:pPr>
+            <a:r>
+              <a:rPr b="0" lang="en-US" sz="2000" strike="noStrike" u="none">
+                <a:solidFill>
+                  <a:srgbClr val="000000"/>
+                </a:solidFill>
+                <a:uFillTx/>
+                <a:latin typeface="Arial"/>
+              </a:rPr>
+              <a:t>Seventh Outline Level</a:t>
+            </a:r>
+            <a:endParaRPr b="0" lang="en-US" sz="2000" strike="noStrike" u="none">
+              <a:solidFill>
+                <a:srgbClr val="000000"/>
+              </a:solidFill>
+              <a:uFillTx/>
+              <a:latin typeface="Arial"/>
+            </a:endParaRPr>
+          </a:p>
+        </p:txBody>
+      </p:sp>
+    </p:spTree>
+  </p:cSld>
+  <p:clrMap bg1="lt1" tx1="dk1" bg2="dk2" tx2="lt2" accent1="accent1" accent2="accent2" accent3="accent3" accent4="accent4" accent5="accent5" accent6="accent6" hlink="hlink" folHlink="folHlink"/>
+  <p:sldLayoutIdLst>
+    <p:sldLayoutId id="2147483667" r:id="rId2"/>
+    <p:sldLayoutId id="2147483668" r:id="rId3"/>
   </p:sldLayoutIdLst>
 </p:sldMaster>
 </file>
@@ -905,8 +1385,8 @@
         </p:nvSpPr>
         <p:spPr>
           <a:xfrm flipH="1" rot="10800000">
-            <a:off x="1441440" y="2572560"/>
-            <a:ext cx="1215360" cy="1591560"/>
+            <a:off x="1440720" y="2572920"/>
+            <a:ext cx="1215000" cy="1591200"/>
           </a:xfrm>
           <a:prstGeom prst="rect">
             <a:avLst/>
@@ -956,8 +1436,8 @@
         </p:nvSpPr>
         <p:spPr>
           <a:xfrm flipH="1" rot="10800000">
-            <a:off x="2658240" y="720"/>
-            <a:ext cx="1215360" cy="2570760"/>
+            <a:off x="2657880" y="1080"/>
+            <a:ext cx="1215000" cy="2570400"/>
           </a:xfrm>
           <a:prstGeom prst="rect">
             <a:avLst/>
@@ -1331,7 +1811,7 @@
         <p:spPr>
           <a:xfrm>
             <a:off x="5270400" y="979560"/>
-            <a:ext cx="1215360" cy="1591560"/>
+            <a:ext cx="1215000" cy="1591200"/>
           </a:xfrm>
           <a:prstGeom prst="rect">
             <a:avLst/>
@@ -1382,7 +1862,7 @@
         <p:spPr>
           <a:xfrm>
             <a:off x="6486480" y="2571840"/>
-            <a:ext cx="1215360" cy="2570760"/>
+            <a:ext cx="1215000" cy="2570400"/>
           </a:xfrm>
           <a:prstGeom prst="rect">
             <a:avLst/>
@@ -1789,7 +2269,7 @@
         <p:spPr>
           <a:xfrm>
             <a:off x="0" y="4834440"/>
-            <a:ext cx="4571280" cy="308520"/>
+            <a:ext cx="4570920" cy="308160"/>
           </a:xfrm>
           <a:prstGeom prst="rect">
             <a:avLst/>
@@ -1840,7 +2320,7 @@
         <p:spPr>
           <a:xfrm>
             <a:off x="4572000" y="4834440"/>
-            <a:ext cx="4571280" cy="308520"/>
+            <a:ext cx="4570920" cy="308160"/>
           </a:xfrm>
           <a:prstGeom prst="rect">
             <a:avLst/>
@@ -2213,8 +2693,8 @@
         </p:nvSpPr>
         <p:spPr>
           <a:xfrm flipH="1" rot="10800000">
-            <a:off x="0" y="2572560"/>
-            <a:ext cx="1215360" cy="2570760"/>
+            <a:off x="-360" y="2572920"/>
+            <a:ext cx="1215000" cy="2570400"/>
           </a:xfrm>
           <a:prstGeom prst="rect">
             <a:avLst/>
@@ -2264,8 +2744,8 @@
         </p:nvSpPr>
         <p:spPr>
           <a:xfrm flipH="1" rot="10800000">
-            <a:off x="1219320" y="1248120"/>
-            <a:ext cx="1215360" cy="1323720"/>
+            <a:off x="1218960" y="1248480"/>
+            <a:ext cx="1215000" cy="1323360"/>
           </a:xfrm>
           <a:prstGeom prst="rect">
             <a:avLst/>
@@ -2638,8 +3118,8 @@
         </p:nvSpPr>
         <p:spPr>
           <a:xfrm flipH="1">
-            <a:off x="-720" y="4834440"/>
-            <a:ext cx="4571280" cy="308520"/>
+            <a:off x="-1440" y="4834440"/>
+            <a:ext cx="4570920" cy="308160"/>
           </a:xfrm>
           <a:prstGeom prst="rect">
             <a:avLst/>
@@ -2689,8 +3169,8 @@
         </p:nvSpPr>
         <p:spPr>
           <a:xfrm flipH="1">
-            <a:off x="4571280" y="4834440"/>
-            <a:ext cx="4571280" cy="308520"/>
+            <a:off x="4570560" y="4834440"/>
+            <a:ext cx="4570920" cy="308160"/>
           </a:xfrm>
           <a:prstGeom prst="rect">
             <a:avLst/>
@@ -3064,7 +3544,7 @@
         <p:spPr>
           <a:xfrm>
             <a:off x="7927920" y="2571480"/>
-            <a:ext cx="1215360" cy="2570760"/>
+            <a:ext cx="1215000" cy="2570400"/>
           </a:xfrm>
           <a:prstGeom prst="rect">
             <a:avLst/>
@@ -3118,8 +3598,8 @@
         </p:nvSpPr>
         <p:spPr>
           <a:xfrm>
-            <a:off x="717840" y="383040"/>
-            <a:ext cx="7707600" cy="739800"/>
+            <a:off x="457200" y="205200"/>
+            <a:ext cx="8228880" cy="858240"/>
           </a:xfrm>
           <a:prstGeom prst="rect">
             <a:avLst/>
@@ -3199,7 +3679,7 @@
         <p:spPr>
           <a:xfrm>
             <a:off x="7927920" y="2571480"/>
-            <a:ext cx="1215360" cy="2570760"/>
+            <a:ext cx="1215000" cy="2570400"/>
           </a:xfrm>
           <a:prstGeom prst="rect">
             <a:avLst/>
@@ -3254,7 +3734,7 @@
         <p:spPr>
           <a:xfrm>
             <a:off x="457200" y="205200"/>
-            <a:ext cx="8229240" cy="858600"/>
+            <a:ext cx="8228880" cy="858240"/>
           </a:xfrm>
           <a:prstGeom prst="rect">
             <a:avLst/>
@@ -3269,11 +3749,11 @@
             <a:noAutofit/>
           </a:bodyPr>
           <a:p>
-            <a:pPr indent="0" algn="ctr">
+            <a:pPr indent="0">
               <a:buNone/>
             </a:pPr>
             <a:r>
-              <a:rPr b="0" lang="en-US" sz="4400" strike="noStrike" u="none">
+              <a:rPr b="0" lang="en-US" sz="1800" strike="noStrike" u="none">
                 <a:solidFill>
                   <a:srgbClr val="000000"/>
                 </a:solidFill>
@@ -3282,246 +3762,7 @@
               </a:rPr>
               <a:t>Click to edit the title text format</a:t>
             </a:r>
-            <a:endParaRPr b="0" lang="en-US" sz="4400" strike="noStrike" u="none">
-              <a:solidFill>
-                <a:srgbClr val="000000"/>
-              </a:solidFill>
-              <a:uFillTx/>
-              <a:latin typeface="Arial"/>
-            </a:endParaRPr>
-          </a:p>
-        </p:txBody>
-      </p:sp>
-      <p:sp>
-        <p:nvSpPr>
-          <p:cNvPr id="31" name="PlaceHolder 2"/>
-          <p:cNvSpPr>
-            <a:spLocks noGrp="1"/>
-          </p:cNvSpPr>
-          <p:nvPr>
-            <p:ph type="body"/>
-          </p:nvPr>
-        </p:nvSpPr>
-        <p:spPr>
-          <a:xfrm>
-            <a:off x="457200" y="1203480"/>
-            <a:ext cx="8229240" cy="2982960"/>
-          </a:xfrm>
-          <a:prstGeom prst="rect">
-            <a:avLst/>
-          </a:prstGeom>
-          <a:noFill/>
-          <a:ln w="0">
-            <a:noFill/>
-          </a:ln>
-        </p:spPr>
-        <p:txBody>
-          <a:bodyPr lIns="0" rIns="0" tIns="0" bIns="0" anchor="t">
-            <a:normAutofit/>
-          </a:bodyPr>
-          <a:p>
-            <a:pPr marL="432000" indent="-324000">
-              <a:spcBef>
-                <a:spcPts val="1417"/>
-              </a:spcBef>
-              <a:buClr>
-                <a:srgbClr val="000000"/>
-              </a:buClr>
-              <a:buSzPct val="45000"/>
-              <a:buFont typeface="Wingdings" charset="2"/>
-              <a:buChar char=""/>
-            </a:pPr>
-            <a:r>
-              <a:rPr b="0" lang="en-US" sz="3200" strike="noStrike" u="none">
-                <a:solidFill>
-                  <a:srgbClr val="000000"/>
-                </a:solidFill>
-                <a:uFillTx/>
-                <a:latin typeface="Arial"/>
-              </a:rPr>
-              <a:t>Click to edit the outline text format</a:t>
-            </a:r>
-            <a:endParaRPr b="0" lang="en-US" sz="3200" strike="noStrike" u="none">
-              <a:solidFill>
-                <a:srgbClr val="000000"/>
-              </a:solidFill>
-              <a:uFillTx/>
-              <a:latin typeface="Arial"/>
-            </a:endParaRPr>
-          </a:p>
-          <a:p>
-            <a:pPr lvl="1" marL="864000" indent="-324000">
-              <a:spcBef>
-                <a:spcPts val="1134"/>
-              </a:spcBef>
-              <a:buClr>
-                <a:srgbClr val="000000"/>
-              </a:buClr>
-              <a:buSzPct val="75000"/>
-              <a:buFont typeface="Symbol" charset="2"/>
-              <a:buChar char=""/>
-            </a:pPr>
-            <a:r>
-              <a:rPr b="0" lang="en-US" sz="2800" strike="noStrike" u="none">
-                <a:solidFill>
-                  <a:srgbClr val="000000"/>
-                </a:solidFill>
-                <a:uFillTx/>
-                <a:latin typeface="Arial"/>
-              </a:rPr>
-              <a:t>Second Outline Level</a:t>
-            </a:r>
-            <a:endParaRPr b="0" lang="en-US" sz="2800" strike="noStrike" u="none">
-              <a:solidFill>
-                <a:srgbClr val="000000"/>
-              </a:solidFill>
-              <a:uFillTx/>
-              <a:latin typeface="Arial"/>
-            </a:endParaRPr>
-          </a:p>
-          <a:p>
-            <a:pPr lvl="2" marL="1296000" indent="-288000">
-              <a:spcBef>
-                <a:spcPts val="850"/>
-              </a:spcBef>
-              <a:buClr>
-                <a:srgbClr val="000000"/>
-              </a:buClr>
-              <a:buSzPct val="45000"/>
-              <a:buFont typeface="Wingdings" charset="2"/>
-              <a:buChar char=""/>
-            </a:pPr>
-            <a:r>
-              <a:rPr b="0" lang="en-US" sz="2400" strike="noStrike" u="none">
-                <a:solidFill>
-                  <a:srgbClr val="000000"/>
-                </a:solidFill>
-                <a:uFillTx/>
-                <a:latin typeface="Arial"/>
-              </a:rPr>
-              <a:t>Third Outline Level</a:t>
-            </a:r>
-            <a:endParaRPr b="0" lang="en-US" sz="2400" strike="noStrike" u="none">
-              <a:solidFill>
-                <a:srgbClr val="000000"/>
-              </a:solidFill>
-              <a:uFillTx/>
-              <a:latin typeface="Arial"/>
-            </a:endParaRPr>
-          </a:p>
-          <a:p>
-            <a:pPr lvl="3" marL="1728000" indent="-216000">
-              <a:spcBef>
-                <a:spcPts val="567"/>
-              </a:spcBef>
-              <a:buClr>
-                <a:srgbClr val="000000"/>
-              </a:buClr>
-              <a:buSzPct val="75000"/>
-              <a:buFont typeface="Symbol" charset="2"/>
-              <a:buChar char=""/>
-            </a:pPr>
-            <a:r>
-              <a:rPr b="0" lang="en-US" sz="2000" strike="noStrike" u="none">
-                <a:solidFill>
-                  <a:srgbClr val="000000"/>
-                </a:solidFill>
-                <a:uFillTx/>
-                <a:latin typeface="Arial"/>
-              </a:rPr>
-              <a:t>Fourth Outline Level</a:t>
-            </a:r>
-            <a:endParaRPr b="0" lang="en-US" sz="2000" strike="noStrike" u="none">
-              <a:solidFill>
-                <a:srgbClr val="000000"/>
-              </a:solidFill>
-              <a:uFillTx/>
-              <a:latin typeface="Arial"/>
-            </a:endParaRPr>
-          </a:p>
-          <a:p>
-            <a:pPr lvl="4" marL="2160000" indent="-216000">
-              <a:spcBef>
-                <a:spcPts val="283"/>
-              </a:spcBef>
-              <a:buClr>
-                <a:srgbClr val="000000"/>
-              </a:buClr>
-              <a:buSzPct val="45000"/>
-              <a:buFont typeface="Wingdings" charset="2"/>
-              <a:buChar char=""/>
-            </a:pPr>
-            <a:r>
-              <a:rPr b="0" lang="en-US" sz="2000" strike="noStrike" u="none">
-                <a:solidFill>
-                  <a:srgbClr val="000000"/>
-                </a:solidFill>
-                <a:uFillTx/>
-                <a:latin typeface="Arial"/>
-              </a:rPr>
-              <a:t>Fifth Outline Level</a:t>
-            </a:r>
-            <a:endParaRPr b="0" lang="en-US" sz="2000" strike="noStrike" u="none">
-              <a:solidFill>
-                <a:srgbClr val="000000"/>
-              </a:solidFill>
-              <a:uFillTx/>
-              <a:latin typeface="Arial"/>
-            </a:endParaRPr>
-          </a:p>
-          <a:p>
-            <a:pPr lvl="5" marL="2592000" indent="-216000">
-              <a:spcBef>
-                <a:spcPts val="283"/>
-              </a:spcBef>
-              <a:buClr>
-                <a:srgbClr val="000000"/>
-              </a:buClr>
-              <a:buSzPct val="45000"/>
-              <a:buFont typeface="Wingdings" charset="2"/>
-              <a:buChar char=""/>
-            </a:pPr>
-            <a:r>
-              <a:rPr b="0" lang="en-US" sz="2000" strike="noStrike" u="none">
-                <a:solidFill>
-                  <a:srgbClr val="000000"/>
-                </a:solidFill>
-                <a:uFillTx/>
-                <a:latin typeface="Arial"/>
-              </a:rPr>
-              <a:t>Sixth Outline Level</a:t>
-            </a:r>
-            <a:endParaRPr b="0" lang="en-US" sz="2000" strike="noStrike" u="none">
-              <a:solidFill>
-                <a:srgbClr val="000000"/>
-              </a:solidFill>
-              <a:uFillTx/>
-              <a:latin typeface="Arial"/>
-            </a:endParaRPr>
-          </a:p>
-          <a:p>
-            <a:pPr lvl="6" marL="3024000" indent="-216000">
-              <a:spcBef>
-                <a:spcPts val="283"/>
-              </a:spcBef>
-              <a:buClr>
-                <a:srgbClr val="000000"/>
-              </a:buClr>
-              <a:buSzPct val="45000"/>
-              <a:buFont typeface="Wingdings" charset="2"/>
-              <a:buChar char=""/>
-            </a:pPr>
-            <a:r>
-              <a:rPr b="0" lang="en-US" sz="2000" strike="noStrike" u="none">
-                <a:solidFill>
-                  <a:srgbClr val="000000"/>
-                </a:solidFill>
-                <a:uFillTx/>
-                <a:latin typeface="Arial"/>
-              </a:rPr>
-              <a:t>Seventh Outline Level</a:t>
-            </a:r>
-            <a:endParaRPr b="0" lang="en-US" sz="2000" strike="noStrike" u="none">
+            <a:endParaRPr b="0" lang="en-US" sz="1800" strike="noStrike" u="none">
               <a:solidFill>
                 <a:srgbClr val="000000"/>
               </a:solidFill>
@@ -3536,7 +3777,6 @@
   <p:clrMap bg1="lt1" tx1="dk1" bg2="dk2" tx2="lt2" accent1="accent1" accent2="accent2" accent3="accent3" accent4="accent4" accent5="accent5" accent6="accent6" hlink="hlink" folHlink="folHlink"/>
   <p:sldLayoutIdLst>
     <p:sldLayoutId id="2147483665" r:id="rId2"/>
-    <p:sldLayoutId id="2147483666" r:id="rId3"/>
   </p:sldLayoutIdLst>
 </p:sldMaster>
 </file>
@@ -3567,7 +3807,7 @@
       </p:grpSpPr>
       <p:sp>
         <p:nvSpPr>
-          <p:cNvPr id="34" name="PlaceHolder 1"/>
+          <p:cNvPr id="38" name="PlaceHolder 1"/>
           <p:cNvSpPr>
             <a:spLocks noGrp="1"/>
           </p:cNvSpPr>
@@ -3578,7 +3818,7 @@
         <p:spPr>
           <a:xfrm>
             <a:off x="1643760" y="1172160"/>
-            <a:ext cx="6770160" cy="2052000"/>
+            <a:ext cx="6769800" cy="2051640"/>
           </a:xfrm>
           <a:prstGeom prst="rect">
             <a:avLst/>
@@ -3636,7 +3876,7 @@
       </p:sp>
       <p:sp>
         <p:nvSpPr>
-          <p:cNvPr id="35" name="PlaceHolder 2"/>
+          <p:cNvPr id="39" name="PlaceHolder 2"/>
           <p:cNvSpPr>
             <a:spLocks noGrp="1"/>
           </p:cNvSpPr>
@@ -3646,8 +3886,8 @@
         </p:nvSpPr>
         <p:spPr>
           <a:xfrm>
-            <a:off x="457200" y="3657600"/>
-            <a:ext cx="4800240" cy="931320"/>
+            <a:off x="457200" y="3183840"/>
+            <a:ext cx="4799880" cy="1616760"/>
           </a:xfrm>
           <a:prstGeom prst="rect">
             <a:avLst/>
@@ -3691,7 +3931,18 @@
                 <a:latin typeface="Montserrat"/>
                 <a:ea typeface="Montserrat"/>
               </a:rPr>
-              <a:t> Turya Biswas</a:t>
+              <a:t> Turya </a:t>
+            </a:r>
+            <a:r>
+              <a:rPr b="0" lang="en-US" sz="1600" strike="noStrike" u="none">
+                <a:solidFill>
+                  <a:schemeClr val="accent2"/>
+                </a:solidFill>
+                <a:uFillTx/>
+                <a:latin typeface="Montserrat"/>
+                <a:ea typeface="Montserrat"/>
+              </a:rPr>
+              <a:t>Biswas</a:t>
             </a:r>
             <a:endParaRPr b="0" lang="en-US" sz="1600" strike="noStrike" u="none">
               <a:solidFill>
@@ -3756,7 +4007,29 @@
                 <a:latin typeface="Montserrat"/>
                 <a:ea typeface="Montserrat"/>
               </a:rPr>
-              <a:t> bsse1507@iit.du.ac.bd</a:t>
+              <a:t> </a:t>
+            </a:r>
+            <a:r>
+              <a:rPr b="0" lang="en-US" sz="1600" strike="noStrike" u="none">
+                <a:solidFill>
+                  <a:schemeClr val="accent2"/>
+                </a:solidFill>
+                <a:uFillTx/>
+                <a:latin typeface="Montserrat"/>
+                <a:ea typeface="Montserrat"/>
+              </a:rPr>
+              <a:t>bsse1507@iit.du.ac.</a:t>
+            </a:r>
+            <a:r>
+              <a:rPr b="0" lang="en-US" sz="1600" strike="noStrike" u="none">
+                <a:solidFill>
+                  <a:schemeClr val="accent2"/>
+                </a:solidFill>
+                <a:uFillTx/>
+                <a:latin typeface="Montserrat"/>
+                <a:ea typeface="Montserrat"/>
+              </a:rPr>
+              <a:t>bd</a:t>
             </a:r>
             <a:endParaRPr b="0" lang="en-US" sz="1600" strike="noStrike" u="none">
               <a:solidFill>
@@ -3796,7 +4069,65 @@
                 <a:latin typeface="Montserrat"/>
                 <a:ea typeface="Montserrat"/>
               </a:rPr>
-              <a:t>Dr. Md. Nurul Ahad Tawhid</a:t>
+              <a:t>Dr. </a:t>
+            </a:r>
+            <a:r>
+              <a:rPr b="0" lang="en-US" sz="1600" strike="noStrike" u="none">
+                <a:solidFill>
+                  <a:schemeClr val="accent2"/>
+                </a:solidFill>
+                <a:uFillTx/>
+                <a:latin typeface="Montserrat"/>
+                <a:ea typeface="Montserrat"/>
+              </a:rPr>
+              <a:t>Md. Nurul Ahad </a:t>
+            </a:r>
+            <a:r>
+              <a:rPr b="0" lang="en-US" sz="1600" strike="noStrike" u="none">
+                <a:solidFill>
+                  <a:schemeClr val="accent2"/>
+                </a:solidFill>
+                <a:uFillTx/>
+                <a:latin typeface="Montserrat"/>
+                <a:ea typeface="Montserrat"/>
+              </a:rPr>
+              <a:t>Tawhid</a:t>
+            </a:r>
+            <a:br>
+              <a:rPr sz="1600"/>
+            </a:br>
+            <a:r>
+              <a:rPr b="1" lang="en-US" sz="1600" strike="noStrike" u="none">
+                <a:solidFill>
+                  <a:schemeClr val="accent2"/>
+                </a:solidFill>
+                <a:uFillTx/>
+                <a:latin typeface="Montserrat"/>
+                <a:ea typeface="Montserrat"/>
+              </a:rPr>
+              <a:t>Git Link: </a:t>
+            </a:r>
+            <a:r>
+              <a:rPr b="0" lang="en-US" sz="1600" strike="noStrike" u="none">
+                <a:solidFill>
+                  <a:schemeClr val="accent2"/>
+                </a:solidFill>
+                <a:uFillTx/>
+                <a:latin typeface="Montserrat"/>
+                <a:ea typeface="Montserrat"/>
+              </a:rPr>
+              <a:t>https://github.com/t</a:t>
+            </a:r>
+            <a:r>
+              <a:rPr b="0" lang="en-US" sz="1600" strike="noStrike" u="none">
+                <a:solidFill>
+                  <a:schemeClr val="accent2"/>
+                </a:solidFill>
+                <a:uFillTx/>
+                <a:latin typeface="Montserrat"/>
+                <a:ea typeface="Montserrat"/>
+              </a:rPr>
+              <a:t>urya07/SPL-1</a:t>
             </a:r>
             <a:endParaRPr b="0" lang="en-US" sz="1600" strike="noStrike" u="none">
               <a:solidFill>
@@ -3858,7 +4189,7 @@
       </p:grpSpPr>
       <p:sp>
         <p:nvSpPr>
-          <p:cNvPr id="63" name="PlaceHolder 1"/>
+          <p:cNvPr id="67" name="PlaceHolder 1"/>
           <p:cNvSpPr>
             <a:spLocks noGrp="1"/>
           </p:cNvSpPr>
@@ -3869,7 +4200,7 @@
         <p:spPr>
           <a:xfrm>
             <a:off x="713520" y="2226960"/>
-            <a:ext cx="4461840" cy="840960"/>
+            <a:ext cx="4461480" cy="840600"/>
           </a:xfrm>
           <a:prstGeom prst="rect">
             <a:avLst/>
@@ -3916,7 +4247,7 @@
       </p:sp>
       <p:sp>
         <p:nvSpPr>
-          <p:cNvPr id="64" name="PlaceHolder 2"/>
+          <p:cNvPr id="68" name="PlaceHolder 2"/>
           <p:cNvSpPr>
             <a:spLocks noGrp="1"/>
           </p:cNvSpPr>
@@ -3927,7 +4258,7 @@
         <p:spPr>
           <a:xfrm>
             <a:off x="713160" y="1262160"/>
-            <a:ext cx="4461840" cy="1141200"/>
+            <a:ext cx="4461480" cy="1140840"/>
           </a:xfrm>
           <a:prstGeom prst="rect">
             <a:avLst/>
@@ -4004,7 +4335,7 @@
       </p:grpSpPr>
       <p:sp>
         <p:nvSpPr>
-          <p:cNvPr id="65" name="PlaceHolder 1"/>
+          <p:cNvPr id="69" name="PlaceHolder 1"/>
           <p:cNvSpPr>
             <a:spLocks noGrp="1"/>
           </p:cNvSpPr>
@@ -4015,7 +4346,7 @@
         <p:spPr>
           <a:xfrm>
             <a:off x="738360" y="774360"/>
-            <a:ext cx="7133040" cy="3397320"/>
+            <a:ext cx="7132680" cy="3396960"/>
           </a:xfrm>
           <a:prstGeom prst="rect">
             <a:avLst/>
@@ -4183,7 +4514,7 @@
       </p:grpSpPr>
       <p:sp>
         <p:nvSpPr>
-          <p:cNvPr id="66" name="PlaceHolder 1"/>
+          <p:cNvPr id="70" name="PlaceHolder 1"/>
           <p:cNvSpPr>
             <a:spLocks noGrp="1"/>
           </p:cNvSpPr>
@@ -4194,7 +4525,7 @@
         <p:spPr>
           <a:xfrm>
             <a:off x="3968280" y="2226960"/>
-            <a:ext cx="4461840" cy="840960"/>
+            <a:ext cx="4461480" cy="840600"/>
           </a:xfrm>
           <a:prstGeom prst="rect">
             <a:avLst/>
@@ -4241,7 +4572,7 @@
       </p:sp>
       <p:sp>
         <p:nvSpPr>
-          <p:cNvPr id="67" name="PlaceHolder 2"/>
+          <p:cNvPr id="71" name="PlaceHolder 2"/>
           <p:cNvSpPr>
             <a:spLocks noGrp="1"/>
           </p:cNvSpPr>
@@ -4252,7 +4583,7 @@
         <p:spPr>
           <a:xfrm>
             <a:off x="3968280" y="1262160"/>
-            <a:ext cx="4461840" cy="1141200"/>
+            <a:ext cx="4461480" cy="1140840"/>
           </a:xfrm>
           <a:prstGeom prst="rect">
             <a:avLst/>
@@ -4329,7 +4660,7 @@
       </p:grpSpPr>
       <p:sp>
         <p:nvSpPr>
-          <p:cNvPr id="68" name="PlaceHolder 1"/>
+          <p:cNvPr id="72" name="PlaceHolder 1"/>
           <p:cNvSpPr>
             <a:spLocks noGrp="1"/>
           </p:cNvSpPr>
@@ -4340,7 +4671,7 @@
         <p:spPr>
           <a:xfrm>
             <a:off x="694080" y="457200"/>
-            <a:ext cx="6163560" cy="3397320"/>
+            <a:ext cx="6163200" cy="3396960"/>
           </a:xfrm>
           <a:prstGeom prst="rect">
             <a:avLst/>
@@ -4357,14 +4688,8 @@
           <a:p>
             <a:pPr marL="457200" indent="-343080">
               <a:lnSpc>
-                <a:spcPct val="150000"/>
+                <a:spcPct val="115000"/>
               </a:lnSpc>
-              <a:spcBef>
-                <a:spcPts val="567"/>
-              </a:spcBef>
-              <a:spcAft>
-                <a:spcPts val="567"/>
-              </a:spcAft>
               <a:buClr>
                 <a:srgbClr val="4a8cff"/>
               </a:buClr>
@@ -4388,19 +4713,14 @@
               </a:solidFill>
               <a:uFillTx/>
               <a:latin typeface="Arial"/>
+              <a:ea typeface="Noto Sans CJK SC"/>
             </a:endParaRPr>
           </a:p>
           <a:p>
             <a:pPr marL="457200" indent="-343080">
               <a:lnSpc>
-                <a:spcPct val="150000"/>
+                <a:spcPct val="115000"/>
               </a:lnSpc>
-              <a:spcBef>
-                <a:spcPts val="567"/>
-              </a:spcBef>
-              <a:spcAft>
-                <a:spcPts val="567"/>
-              </a:spcAft>
               <a:buClr>
                 <a:srgbClr val="4a8cff"/>
               </a:buClr>
@@ -4424,19 +4744,14 @@
               </a:solidFill>
               <a:uFillTx/>
               <a:latin typeface="Arial"/>
+              <a:ea typeface="Noto Sans CJK SC"/>
             </a:endParaRPr>
           </a:p>
           <a:p>
             <a:pPr marL="457200" indent="-343080">
               <a:lnSpc>
-                <a:spcPct val="150000"/>
+                <a:spcPct val="115000"/>
               </a:lnSpc>
-              <a:spcBef>
-                <a:spcPts val="567"/>
-              </a:spcBef>
-              <a:spcAft>
-                <a:spcPts val="567"/>
-              </a:spcAft>
               <a:buClr>
                 <a:srgbClr val="4a8cff"/>
               </a:buClr>
@@ -4460,19 +4775,14 @@
               </a:solidFill>
               <a:uFillTx/>
               <a:latin typeface="Arial"/>
+              <a:ea typeface="Noto Sans CJK SC"/>
             </a:endParaRPr>
           </a:p>
           <a:p>
             <a:pPr marL="457200" indent="-343080">
               <a:lnSpc>
-                <a:spcPct val="150000"/>
+                <a:spcPct val="115000"/>
               </a:lnSpc>
-              <a:spcBef>
-                <a:spcPts val="567"/>
-              </a:spcBef>
-              <a:spcAft>
-                <a:spcPts val="567"/>
-              </a:spcAft>
               <a:buClr>
                 <a:srgbClr val="4a8cff"/>
               </a:buClr>
@@ -4518,6 +4828,7 @@
               </a:solidFill>
               <a:uFillTx/>
               <a:latin typeface="Arial"/>
+              <a:ea typeface="Noto Sans CJK SC"/>
             </a:endParaRPr>
           </a:p>
         </p:txBody>
@@ -4554,7 +4865,7 @@
       </p:grpSpPr>
       <p:sp>
         <p:nvSpPr>
-          <p:cNvPr id="69" name="PlaceHolder 1"/>
+          <p:cNvPr id="73" name="PlaceHolder 1"/>
           <p:cNvSpPr>
             <a:spLocks noGrp="1"/>
           </p:cNvSpPr>
@@ -4565,7 +4876,7 @@
         <p:spPr>
           <a:xfrm>
             <a:off x="2230200" y="1640880"/>
-            <a:ext cx="4410360" cy="1156680"/>
+            <a:ext cx="4410000" cy="1156320"/>
           </a:xfrm>
           <a:prstGeom prst="rect">
             <a:avLst/>
@@ -4641,7 +4952,7 @@
       </p:grpSpPr>
       <p:sp>
         <p:nvSpPr>
-          <p:cNvPr id="36" name="PlaceHolder 1"/>
+          <p:cNvPr id="40" name="PlaceHolder 1"/>
           <p:cNvSpPr>
             <a:spLocks noGrp="1"/>
           </p:cNvSpPr>
@@ -4652,7 +4963,7 @@
         <p:spPr>
           <a:xfrm>
             <a:off x="717840" y="383040"/>
-            <a:ext cx="7707600" cy="572040"/>
+            <a:ext cx="7707240" cy="571680"/>
           </a:xfrm>
           <a:prstGeom prst="rect">
             <a:avLst/>
@@ -4699,7 +5010,7 @@
       </p:sp>
       <p:sp>
         <p:nvSpPr>
-          <p:cNvPr id="37" name="PlaceHolder 2"/>
+          <p:cNvPr id="41" name="PlaceHolder 2"/>
           <p:cNvSpPr>
             <a:spLocks noGrp="1"/>
           </p:cNvSpPr>
@@ -4710,7 +5021,7 @@
         <p:spPr>
           <a:xfrm>
             <a:off x="1257120" y="1262160"/>
-            <a:ext cx="3918960" cy="632880"/>
+            <a:ext cx="3918600" cy="632520"/>
           </a:xfrm>
           <a:prstGeom prst="rect">
             <a:avLst/>
@@ -4760,14 +5071,14 @@
       </p:sp>
       <p:sp>
         <p:nvSpPr>
-          <p:cNvPr id="38" name="TextBox 9"/>
+          <p:cNvPr id="42" name="TextBox 9"/>
           <p:cNvSpPr/>
           <p:nvPr/>
         </p:nvSpPr>
         <p:spPr>
           <a:xfrm>
             <a:off x="1257120" y="1740600"/>
-            <a:ext cx="2857320" cy="455400"/>
+            <a:ext cx="2856960" cy="455400"/>
           </a:xfrm>
           <a:prstGeom prst="rect">
             <a:avLst/>
@@ -4838,14 +5149,14 @@
       </p:sp>
       <p:sp>
         <p:nvSpPr>
-          <p:cNvPr id="39" name="TextBox 10"/>
+          <p:cNvPr id="43" name="TextBox 10"/>
           <p:cNvSpPr/>
           <p:nvPr/>
         </p:nvSpPr>
         <p:spPr>
           <a:xfrm>
             <a:off x="1257120" y="2202120"/>
-            <a:ext cx="2144160" cy="455400"/>
+            <a:ext cx="2143800" cy="455400"/>
           </a:xfrm>
           <a:prstGeom prst="rect">
             <a:avLst/>
@@ -4894,14 +5205,14 @@
       </p:sp>
       <p:sp>
         <p:nvSpPr>
-          <p:cNvPr id="40" name="TextBox 11"/>
+          <p:cNvPr id="44" name="TextBox 11"/>
           <p:cNvSpPr/>
           <p:nvPr/>
         </p:nvSpPr>
         <p:spPr>
           <a:xfrm>
             <a:off x="1257120" y="2663640"/>
-            <a:ext cx="2857320" cy="455400"/>
+            <a:ext cx="2856960" cy="455400"/>
           </a:xfrm>
           <a:prstGeom prst="rect">
             <a:avLst/>
@@ -4950,14 +5261,14 @@
       </p:sp>
       <p:sp>
         <p:nvSpPr>
-          <p:cNvPr id="41" name="TextBox 12"/>
+          <p:cNvPr id="45" name="TextBox 12"/>
           <p:cNvSpPr/>
           <p:nvPr/>
         </p:nvSpPr>
         <p:spPr>
           <a:xfrm>
             <a:off x="1257120" y="3119760"/>
-            <a:ext cx="3684600" cy="455400"/>
+            <a:ext cx="3684240" cy="455400"/>
           </a:xfrm>
           <a:prstGeom prst="rect">
             <a:avLst/>
@@ -5036,7 +5347,7 @@
       </p:grpSpPr>
       <p:sp>
         <p:nvSpPr>
-          <p:cNvPr id="42" name="PlaceHolder 1"/>
+          <p:cNvPr id="46" name="PlaceHolder 1"/>
           <p:cNvSpPr>
             <a:spLocks noGrp="1"/>
           </p:cNvSpPr>
@@ -5047,7 +5358,7 @@
         <p:spPr>
           <a:xfrm>
             <a:off x="3968280" y="2226960"/>
-            <a:ext cx="4461840" cy="840960"/>
+            <a:ext cx="4461480" cy="840600"/>
           </a:xfrm>
           <a:prstGeom prst="rect">
             <a:avLst/>
@@ -5080,7 +5391,18 @@
                 <a:latin typeface="Montserrat"/>
                 <a:ea typeface="Montserrat"/>
               </a:rPr>
-              <a:t>Introduction</a:t>
+              <a:t>Introduct</a:t>
+            </a:r>
+            <a:r>
+              <a:rPr b="1" lang="en" sz="4700" strike="noStrike" u="none">
+                <a:solidFill>
+                  <a:schemeClr val="accent1"/>
+                </a:solidFill>
+                <a:uFillTx/>
+                <a:latin typeface="Montserrat"/>
+                <a:ea typeface="Montserrat"/>
+              </a:rPr>
+              <a:t>ion</a:t>
             </a:r>
             <a:endParaRPr b="0" lang="en-US" sz="4700" strike="noStrike" u="none">
               <a:solidFill>
@@ -5094,7 +5416,7 @@
       </p:sp>
       <p:sp>
         <p:nvSpPr>
-          <p:cNvPr id="43" name="PlaceHolder 2"/>
+          <p:cNvPr id="47" name="PlaceHolder 2"/>
           <p:cNvSpPr>
             <a:spLocks noGrp="1"/>
           </p:cNvSpPr>
@@ -5105,7 +5427,7 @@
         <p:spPr>
           <a:xfrm>
             <a:off x="3968280" y="1262160"/>
-            <a:ext cx="4461840" cy="1141200"/>
+            <a:ext cx="4461480" cy="1140840"/>
           </a:xfrm>
           <a:prstGeom prst="rect">
             <a:avLst/>
@@ -5182,7 +5504,7 @@
       </p:grpSpPr>
       <p:sp>
         <p:nvSpPr>
-          <p:cNvPr id="44" name="PlaceHolder 1"/>
+          <p:cNvPr id="48" name="PlaceHolder 1"/>
           <p:cNvSpPr>
             <a:spLocks noGrp="1"/>
           </p:cNvSpPr>
@@ -5193,7 +5515,7 @@
         <p:spPr>
           <a:xfrm>
             <a:off x="3231360" y="1516320"/>
-            <a:ext cx="4054680" cy="722160"/>
+            <a:ext cx="4054320" cy="721800"/>
           </a:xfrm>
           <a:prstGeom prst="rect">
             <a:avLst/>
@@ -5240,7 +5562,7 @@
       </p:sp>
       <p:sp>
         <p:nvSpPr>
-          <p:cNvPr id="45" name="PlaceHolder 2"/>
+          <p:cNvPr id="49" name="PlaceHolder 2"/>
           <p:cNvSpPr>
             <a:spLocks noGrp="1"/>
           </p:cNvSpPr>
@@ -5251,7 +5573,7 @@
         <p:spPr>
           <a:xfrm>
             <a:off x="3231360" y="2108160"/>
-            <a:ext cx="5183280" cy="2476800"/>
+            <a:ext cx="5182920" cy="2476440"/>
           </a:xfrm>
           <a:prstGeom prst="rect">
             <a:avLst/>
@@ -5373,7 +5695,7 @@
       </p:grpSpPr>
       <p:sp>
         <p:nvSpPr>
-          <p:cNvPr id="46" name="PlaceHolder 1"/>
+          <p:cNvPr id="50" name="PlaceHolder 1"/>
           <p:cNvSpPr>
             <a:spLocks noGrp="1"/>
           </p:cNvSpPr>
@@ -5384,7 +5706,7 @@
         <p:spPr>
           <a:xfrm>
             <a:off x="3968280" y="2226960"/>
-            <a:ext cx="4461840" cy="840960"/>
+            <a:ext cx="4461480" cy="840600"/>
           </a:xfrm>
           <a:prstGeom prst="rect">
             <a:avLst/>
@@ -5431,7 +5753,7 @@
       </p:sp>
       <p:sp>
         <p:nvSpPr>
-          <p:cNvPr id="47" name="PlaceHolder 2"/>
+          <p:cNvPr id="51" name="PlaceHolder 2"/>
           <p:cNvSpPr>
             <a:spLocks noGrp="1"/>
           </p:cNvSpPr>
@@ -5442,7 +5764,7 @@
         <p:spPr>
           <a:xfrm>
             <a:off x="3968280" y="1262160"/>
-            <a:ext cx="4461840" cy="1141200"/>
+            <a:ext cx="4461480" cy="1140840"/>
           </a:xfrm>
           <a:prstGeom prst="rect">
             <a:avLst/>
@@ -5519,7 +5841,7 @@
       </p:grpSpPr>
       <p:sp>
         <p:nvSpPr>
-          <p:cNvPr id="48" name="PlaceHolder 1"/>
+          <p:cNvPr id="52" name="PlaceHolder 1"/>
           <p:cNvSpPr>
             <a:spLocks noGrp="1"/>
           </p:cNvSpPr>
@@ -5530,7 +5852,7 @@
         <p:spPr>
           <a:xfrm>
             <a:off x="2621880" y="1071360"/>
-            <a:ext cx="5652720" cy="3010680"/>
+            <a:ext cx="5652360" cy="3010320"/>
           </a:xfrm>
           <a:prstGeom prst="rect">
             <a:avLst/>
@@ -5652,7 +5974,7 @@
       </p:grpSpPr>
       <p:sp>
         <p:nvSpPr>
-          <p:cNvPr id="49" name="PlaceHolder 1"/>
+          <p:cNvPr id="53" name="PlaceHolder 1"/>
           <p:cNvSpPr>
             <a:spLocks noGrp="1"/>
           </p:cNvSpPr>
@@ -5663,7 +5985,7 @@
         <p:spPr>
           <a:xfrm>
             <a:off x="713520" y="2226960"/>
-            <a:ext cx="4461840" cy="840960"/>
+            <a:ext cx="4461480" cy="840600"/>
           </a:xfrm>
           <a:prstGeom prst="rect">
             <a:avLst/>
@@ -5710,7 +6032,7 @@
       </p:sp>
       <p:sp>
         <p:nvSpPr>
-          <p:cNvPr id="50" name="PlaceHolder 2"/>
+          <p:cNvPr id="54" name="PlaceHolder 2"/>
           <p:cNvSpPr>
             <a:spLocks noGrp="1"/>
           </p:cNvSpPr>
@@ -5721,7 +6043,7 @@
         <p:spPr>
           <a:xfrm>
             <a:off x="713160" y="1262160"/>
-            <a:ext cx="4461840" cy="1141200"/>
+            <a:ext cx="4461480" cy="1140840"/>
           </a:xfrm>
           <a:prstGeom prst="rect">
             <a:avLst/>
@@ -5798,7 +6120,7 @@
       </p:grpSpPr>
       <p:sp>
         <p:nvSpPr>
-          <p:cNvPr id="51" name="PlaceHolder 1"/>
+          <p:cNvPr id="55" name="PlaceHolder 1"/>
           <p:cNvSpPr>
             <a:spLocks noGrp="1"/>
           </p:cNvSpPr>
@@ -5809,7 +6131,7 @@
         <p:spPr>
           <a:xfrm>
             <a:off x="228600" y="364680"/>
-            <a:ext cx="4527360" cy="777960"/>
+            <a:ext cx="4527000" cy="777600"/>
           </a:xfrm>
           <a:prstGeom prst="rect">
             <a:avLst/>
@@ -5856,7 +6178,7 @@
       </p:sp>
       <p:pic>
         <p:nvPicPr>
-          <p:cNvPr id="52" name="" descr=""/>
+          <p:cNvPr id="56" name="" descr=""/>
           <p:cNvPicPr/>
           <p:nvPr/>
         </p:nvPicPr>
@@ -5867,7 +6189,7 @@
         <p:spPr>
           <a:xfrm>
             <a:off x="825840" y="1193760"/>
-            <a:ext cx="1328400" cy="1166400"/>
+            <a:ext cx="1328040" cy="1166040"/>
           </a:xfrm>
           <a:prstGeom prst="rect">
             <a:avLst/>
@@ -5880,14 +6202,14 @@
       </p:pic>
       <p:sp>
         <p:nvSpPr>
-          <p:cNvPr id="53" name=""/>
+          <p:cNvPr id="57" name=""/>
           <p:cNvSpPr/>
           <p:nvPr/>
         </p:nvSpPr>
         <p:spPr>
           <a:xfrm>
             <a:off x="2324160" y="1370160"/>
-            <a:ext cx="695880" cy="827640"/>
+            <a:ext cx="695520" cy="827280"/>
           </a:xfrm>
           <a:prstGeom prst="rect">
             <a:avLst/>
@@ -5935,7 +6257,7 @@
       </p:sp>
       <p:pic>
         <p:nvPicPr>
-          <p:cNvPr id="54" name="" descr=""/>
+          <p:cNvPr id="58" name="" descr=""/>
           <p:cNvPicPr/>
           <p:nvPr/>
         </p:nvPicPr>
@@ -5946,7 +6268,7 @@
         <p:spPr>
           <a:xfrm>
             <a:off x="3031560" y="1143000"/>
-            <a:ext cx="1131480" cy="1137960"/>
+            <a:ext cx="1131120" cy="1137600"/>
           </a:xfrm>
           <a:prstGeom prst="rect">
             <a:avLst/>
@@ -5959,7 +6281,7 @@
       </p:pic>
       <p:pic>
         <p:nvPicPr>
-          <p:cNvPr id="55" name="" descr=""/>
+          <p:cNvPr id="59" name="" descr=""/>
           <p:cNvPicPr/>
           <p:nvPr/>
         </p:nvPicPr>
@@ -5970,7 +6292,7 @@
         <p:spPr>
           <a:xfrm>
             <a:off x="914400" y="3260160"/>
-            <a:ext cx="3200040" cy="1082880"/>
+            <a:ext cx="3199680" cy="1082520"/>
           </a:xfrm>
           <a:prstGeom prst="rect">
             <a:avLst/>
@@ -5983,14 +6305,14 @@
       </p:pic>
       <p:sp>
         <p:nvSpPr>
-          <p:cNvPr id="56" name=""/>
+          <p:cNvPr id="60" name=""/>
           <p:cNvSpPr/>
           <p:nvPr/>
         </p:nvSpPr>
         <p:spPr>
           <a:xfrm>
             <a:off x="818280" y="2696760"/>
-            <a:ext cx="3524760" cy="503280"/>
+            <a:ext cx="3524400" cy="502920"/>
           </a:xfrm>
           <a:prstGeom prst="rect">
             <a:avLst/>
@@ -6069,7 +6391,7 @@
       </p:grpSpPr>
       <p:sp>
         <p:nvSpPr>
-          <p:cNvPr id="57" name="PlaceHolder 1"/>
+          <p:cNvPr id="61" name="PlaceHolder 1"/>
           <p:cNvSpPr>
             <a:spLocks noGrp="1"/>
           </p:cNvSpPr>
@@ -6080,7 +6402,7 @@
         <p:spPr>
           <a:xfrm>
             <a:off x="632520" y="794160"/>
-            <a:ext cx="4397760" cy="654120"/>
+            <a:ext cx="4397400" cy="653760"/>
           </a:xfrm>
           <a:prstGeom prst="rect">
             <a:avLst/>
@@ -6127,14 +6449,14 @@
       </p:sp>
       <p:sp>
         <p:nvSpPr>
-          <p:cNvPr id="58" name="TextBox 2"/>
+          <p:cNvPr id="62" name="TextBox 2"/>
           <p:cNvSpPr/>
           <p:nvPr/>
         </p:nvSpPr>
         <p:spPr>
           <a:xfrm>
             <a:off x="818280" y="1765080"/>
-            <a:ext cx="3524760" cy="516600"/>
+            <a:ext cx="3524400" cy="516600"/>
           </a:xfrm>
           <a:prstGeom prst="rect">
             <a:avLst/>
@@ -6183,14 +6505,14 @@
       </p:sp>
       <p:sp>
         <p:nvSpPr>
-          <p:cNvPr id="59" name="TextBox 3"/>
+          <p:cNvPr id="63" name="TextBox 3"/>
           <p:cNvSpPr/>
           <p:nvPr/>
         </p:nvSpPr>
         <p:spPr>
           <a:xfrm>
             <a:off x="818280" y="2282400"/>
-            <a:ext cx="5124960" cy="516600"/>
+            <a:ext cx="5124600" cy="516600"/>
           </a:xfrm>
           <a:prstGeom prst="rect">
             <a:avLst/>
@@ -6239,14 +6561,14 @@
       </p:sp>
       <p:sp>
         <p:nvSpPr>
-          <p:cNvPr id="60" name="TextBox 4"/>
+          <p:cNvPr id="64" name="TextBox 4"/>
           <p:cNvSpPr/>
           <p:nvPr/>
         </p:nvSpPr>
         <p:spPr>
           <a:xfrm>
             <a:off x="866520" y="3276000"/>
-            <a:ext cx="2226960" cy="516600"/>
+            <a:ext cx="2226600" cy="516600"/>
           </a:xfrm>
           <a:prstGeom prst="rect">
             <a:avLst/>
@@ -6295,14 +6617,14 @@
       </p:sp>
       <p:sp>
         <p:nvSpPr>
-          <p:cNvPr id="61" name="TextBox 6"/>
+          <p:cNvPr id="65" name="TextBox 6"/>
           <p:cNvSpPr/>
           <p:nvPr/>
         </p:nvSpPr>
         <p:spPr>
           <a:xfrm>
             <a:off x="866520" y="2799720"/>
-            <a:ext cx="2790720" cy="516600"/>
+            <a:ext cx="2790360" cy="516600"/>
           </a:xfrm>
           <a:prstGeom prst="rect">
             <a:avLst/>
@@ -6351,14 +6673,14 @@
       </p:sp>
       <p:sp>
         <p:nvSpPr>
-          <p:cNvPr id="62" name=""/>
+          <p:cNvPr id="66" name=""/>
           <p:cNvSpPr/>
           <p:nvPr/>
         </p:nvSpPr>
         <p:spPr>
           <a:xfrm>
             <a:off x="457200" y="4114800"/>
-            <a:ext cx="8229240" cy="601920"/>
+            <a:ext cx="8228880" cy="601560"/>
           </a:xfrm>
           <a:prstGeom prst="rect">
             <a:avLst/>
@@ -6709,6 +7031,178 @@
 </a:theme>
 </file>
 
+<file path=ppt/theme/theme10.xml><?xml version="1.0" encoding="utf-8"?>
+<a:theme xmlns:a="http://schemas.openxmlformats.org/drawingml/2006/main" xmlns:r="http://schemas.openxmlformats.org/officeDocument/2006/relationships" name="Management Consulting Toolkit by Slidesgo">
+  <a:themeElements>
+    <a:clrScheme name="Simple Light">
+      <a:dk1>
+        <a:srgbClr val="000000"/>
+      </a:dk1>
+      <a:lt1>
+        <a:srgbClr val="ffffff"/>
+      </a:lt1>
+      <a:dk2>
+        <a:srgbClr val="4a8cff"/>
+      </a:dk2>
+      <a:lt2>
+        <a:srgbClr val="efefef"/>
+      </a:lt2>
+      <a:accent1>
+        <a:srgbClr val="003ba3"/>
+      </a:accent1>
+      <a:accent2>
+        <a:srgbClr val="000000"/>
+      </a:accent2>
+      <a:accent3>
+        <a:srgbClr val="4a8cff"/>
+      </a:accent3>
+      <a:accent4>
+        <a:srgbClr val="efefef"/>
+      </a:accent4>
+      <a:accent5>
+        <a:srgbClr val="003ba3"/>
+      </a:accent5>
+      <a:accent6>
+        <a:srgbClr val="000000"/>
+      </a:accent6>
+      <a:hlink>
+        <a:srgbClr val="003ba3"/>
+      </a:hlink>
+      <a:folHlink>
+        <a:srgbClr val="0097a7"/>
+      </a:folHlink>
+    </a:clrScheme>
+    <a:fontScheme name="Office">
+      <a:majorFont>
+        <a:latin typeface="Arial" pitchFamily="0" charset="1"/>
+        <a:ea typeface=""/>
+        <a:cs typeface=""/>
+      </a:majorFont>
+      <a:minorFont>
+        <a:latin typeface="Arial" pitchFamily="0" charset="1"/>
+        <a:ea typeface=""/>
+        <a:cs typeface=""/>
+      </a:minorFont>
+    </a:fontScheme>
+    <a:fmtScheme>
+      <a:fillStyleLst>
+        <a:solidFill>
+          <a:schemeClr val="phClr"/>
+        </a:solidFill>
+        <a:gradFill>
+          <a:gsLst>
+            <a:gs pos="0">
+              <a:schemeClr val="phClr">
+                <a:tint val="50000"/>
+              </a:schemeClr>
+            </a:gs>
+            <a:gs pos="35000">
+              <a:schemeClr val="phClr">
+                <a:tint val="37000"/>
+              </a:schemeClr>
+            </a:gs>
+            <a:gs pos="100000">
+              <a:schemeClr val="phClr">
+                <a:tint val="15000"/>
+              </a:schemeClr>
+            </a:gs>
+          </a:gsLst>
+          <a:lin ang="16200000" scaled="1"/>
+          <a:tileRect l="0" t="0" r="0" b="0"/>
+        </a:gradFill>
+        <a:gradFill>
+          <a:gsLst>
+            <a:gs pos="0">
+              <a:schemeClr val="phClr">
+                <a:tint val="100000"/>
+                <a:shade val="100000"/>
+              </a:schemeClr>
+            </a:gs>
+            <a:gs pos="100000">
+              <a:schemeClr val="phClr">
+                <a:tint val="50000"/>
+                <a:shade val="100000"/>
+              </a:schemeClr>
+            </a:gs>
+          </a:gsLst>
+          <a:lin ang="16200000" scaled="0"/>
+          <a:tileRect l="0" t="0" r="0" b="0"/>
+        </a:gradFill>
+      </a:fillStyleLst>
+      <a:lnStyleLst>
+        <a:ln w="9525" cap="flat" cmpd="sng" algn="ctr">
+          <a:prstDash val="solid"/>
+        </a:ln>
+        <a:ln w="25400" cap="flat" cmpd="sng" algn="ctr">
+          <a:prstDash val="solid"/>
+        </a:ln>
+        <a:ln w="38100" cap="flat" cmpd="sng" algn="ctr">
+          <a:prstDash val="solid"/>
+        </a:ln>
+      </a:lnStyleLst>
+      <a:effectStyleLst>
+        <a:effectStyle>
+          <a:effectLst/>
+        </a:effectStyle>
+        <a:effectStyle>
+          <a:effectLst/>
+        </a:effectStyle>
+        <a:effectStyle>
+          <a:effectLst/>
+        </a:effectStyle>
+      </a:effectStyleLst>
+      <a:bgFillStyleLst>
+        <a:solidFill>
+          <a:schemeClr val="phClr"/>
+        </a:solidFill>
+        <a:gradFill>
+          <a:gsLst>
+            <a:gs pos="0">
+              <a:schemeClr val="phClr">
+                <a:tint val="40000"/>
+              </a:schemeClr>
+            </a:gs>
+            <a:gs pos="40000">
+              <a:schemeClr val="phClr">
+                <a:tint val="45000"/>
+                <a:shade val="99000"/>
+              </a:schemeClr>
+            </a:gs>
+            <a:gs pos="100000">
+              <a:schemeClr val="phClr">
+                <a:shade val="20000"/>
+              </a:schemeClr>
+            </a:gs>
+          </a:gsLst>
+          <a:path path="circle">
+            <a:fillToRect l="50000" t="-80000" r="50000" b="180000"/>
+          </a:path>
+          <a:tileRect l="0" t="0" r="0" b="0"/>
+        </a:gradFill>
+        <a:gradFill>
+          <a:gsLst>
+            <a:gs pos="0">
+              <a:schemeClr val="phClr">
+                <a:tint val="80000"/>
+              </a:schemeClr>
+            </a:gs>
+            <a:gs pos="100000">
+              <a:schemeClr val="phClr">
+                <a:shade val="30000"/>
+              </a:schemeClr>
+            </a:gs>
+          </a:gsLst>
+          <a:path path="circle">
+            <a:fillToRect l="50000" t="50000" r="50000" b="50000"/>
+          </a:path>
+          <a:tileRect l="0" t="0" r="0" b="0"/>
+        </a:gradFill>
+      </a:bgFillStyleLst>
+    </a:fmtScheme>
+  </a:themeElements>
+</a:theme>
+</file>
+
 <file path=ppt/theme/theme2.xml><?xml version="1.0" encoding="utf-8"?>
 <a:theme xmlns:a="http://schemas.openxmlformats.org/drawingml/2006/main" xmlns:r="http://schemas.openxmlformats.org/officeDocument/2006/relationships" name="Management Consulting Toolkit by Slidesgo">
   <a:themeElements>

</xml_diff>